<commit_message>
Created Web Interface and Optimiser
</commit_message>
<xml_diff>
--- a/Files/LOGO.pptx
+++ b/Files/LOGO.pptx
@@ -7,6 +7,7 @@
   <p:sldIdLst>
     <p:sldId id="256" r:id="rId2"/>
     <p:sldId id="257" r:id="rId3"/>
+    <p:sldId id="258" r:id="rId4"/>
   </p:sldIdLst>
   <p:sldSz cx="12192000" cy="6858000"/>
   <p:notesSz cx="6858000" cy="9144000"/>
@@ -244,7 +245,7 @@
           <a:p>
             <a:fld id="{9634CD8C-1A63-4A11-BBCD-8223A124EB2B}" type="datetimeFigureOut">
               <a:rPr lang="en-GB" smtClean="0"/>
-              <a:t>18/04/2019</a:t>
+              <a:t>27/04/2019</a:t>
             </a:fld>
             <a:endParaRPr lang="en-GB"/>
           </a:p>
@@ -414,7 +415,7 @@
           <a:p>
             <a:fld id="{9634CD8C-1A63-4A11-BBCD-8223A124EB2B}" type="datetimeFigureOut">
               <a:rPr lang="en-GB" smtClean="0"/>
-              <a:t>18/04/2019</a:t>
+              <a:t>27/04/2019</a:t>
             </a:fld>
             <a:endParaRPr lang="en-GB"/>
           </a:p>
@@ -594,7 +595,7 @@
           <a:p>
             <a:fld id="{9634CD8C-1A63-4A11-BBCD-8223A124EB2B}" type="datetimeFigureOut">
               <a:rPr lang="en-GB" smtClean="0"/>
-              <a:t>18/04/2019</a:t>
+              <a:t>27/04/2019</a:t>
             </a:fld>
             <a:endParaRPr lang="en-GB"/>
           </a:p>
@@ -764,7 +765,7 @@
           <a:p>
             <a:fld id="{9634CD8C-1A63-4A11-BBCD-8223A124EB2B}" type="datetimeFigureOut">
               <a:rPr lang="en-GB" smtClean="0"/>
-              <a:t>18/04/2019</a:t>
+              <a:t>27/04/2019</a:t>
             </a:fld>
             <a:endParaRPr lang="en-GB"/>
           </a:p>
@@ -1010,7 +1011,7 @@
           <a:p>
             <a:fld id="{9634CD8C-1A63-4A11-BBCD-8223A124EB2B}" type="datetimeFigureOut">
               <a:rPr lang="en-GB" smtClean="0"/>
-              <a:t>18/04/2019</a:t>
+              <a:t>27/04/2019</a:t>
             </a:fld>
             <a:endParaRPr lang="en-GB"/>
           </a:p>
@@ -1242,7 +1243,7 @@
           <a:p>
             <a:fld id="{9634CD8C-1A63-4A11-BBCD-8223A124EB2B}" type="datetimeFigureOut">
               <a:rPr lang="en-GB" smtClean="0"/>
-              <a:t>18/04/2019</a:t>
+              <a:t>27/04/2019</a:t>
             </a:fld>
             <a:endParaRPr lang="en-GB"/>
           </a:p>
@@ -1609,7 +1610,7 @@
           <a:p>
             <a:fld id="{9634CD8C-1A63-4A11-BBCD-8223A124EB2B}" type="datetimeFigureOut">
               <a:rPr lang="en-GB" smtClean="0"/>
-              <a:t>18/04/2019</a:t>
+              <a:t>27/04/2019</a:t>
             </a:fld>
             <a:endParaRPr lang="en-GB"/>
           </a:p>
@@ -1727,7 +1728,7 @@
           <a:p>
             <a:fld id="{9634CD8C-1A63-4A11-BBCD-8223A124EB2B}" type="datetimeFigureOut">
               <a:rPr lang="en-GB" smtClean="0"/>
-              <a:t>18/04/2019</a:t>
+              <a:t>27/04/2019</a:t>
             </a:fld>
             <a:endParaRPr lang="en-GB"/>
           </a:p>
@@ -1822,7 +1823,7 @@
           <a:p>
             <a:fld id="{9634CD8C-1A63-4A11-BBCD-8223A124EB2B}" type="datetimeFigureOut">
               <a:rPr lang="en-GB" smtClean="0"/>
-              <a:t>18/04/2019</a:t>
+              <a:t>27/04/2019</a:t>
             </a:fld>
             <a:endParaRPr lang="en-GB"/>
           </a:p>
@@ -2099,7 +2100,7 @@
           <a:p>
             <a:fld id="{9634CD8C-1A63-4A11-BBCD-8223A124EB2B}" type="datetimeFigureOut">
               <a:rPr lang="en-GB" smtClean="0"/>
-              <a:t>18/04/2019</a:t>
+              <a:t>27/04/2019</a:t>
             </a:fld>
             <a:endParaRPr lang="en-GB"/>
           </a:p>
@@ -2352,7 +2353,7 @@
           <a:p>
             <a:fld id="{9634CD8C-1A63-4A11-BBCD-8223A124EB2B}" type="datetimeFigureOut">
               <a:rPr lang="en-GB" smtClean="0"/>
-              <a:t>18/04/2019</a:t>
+              <a:t>27/04/2019</a:t>
             </a:fld>
             <a:endParaRPr lang="en-GB"/>
           </a:p>
@@ -2565,7 +2566,7 @@
           <a:p>
             <a:fld id="{9634CD8C-1A63-4A11-BBCD-8223A124EB2B}" type="datetimeFigureOut">
               <a:rPr lang="en-GB" smtClean="0"/>
-              <a:t>18/04/2019</a:t>
+              <a:t>27/04/2019</a:t>
             </a:fld>
             <a:endParaRPr lang="en-GB"/>
           </a:p>
@@ -3417,6 +3418,12 @@
           <a:prstGeom prst="roundRect">
             <a:avLst/>
           </a:prstGeom>
+          <a:solidFill>
+            <a:srgbClr val="212121"/>
+          </a:solidFill>
+          <a:ln>
+            <a:noFill/>
+          </a:ln>
         </p:spPr>
         <p:style>
           <a:lnRef idx="2">
@@ -3856,6 +3863,689 @@
     <p:extLst>
       <p:ext uri="{BB962C8B-B14F-4D97-AF65-F5344CB8AC3E}">
         <p14:creationId xmlns:p14="http://schemas.microsoft.com/office/powerpoint/2010/main" val="3224717936"/>
+      </p:ext>
+    </p:extLst>
+  </p:cSld>
+  <p:clrMapOvr>
+    <a:masterClrMapping/>
+  </p:clrMapOvr>
+</p:sld>
+</file>
+
+<file path=ppt/slides/slide3.xml><?xml version="1.0" encoding="utf-8"?>
+<p:sld xmlns:a="http://schemas.openxmlformats.org/drawingml/2006/main" xmlns:r="http://schemas.openxmlformats.org/officeDocument/2006/relationships" xmlns:p="http://schemas.openxmlformats.org/presentationml/2006/main">
+  <p:cSld>
+    <p:spTree>
+      <p:nvGrpSpPr>
+        <p:cNvPr id="1" name=""/>
+        <p:cNvGrpSpPr/>
+        <p:nvPr/>
+      </p:nvGrpSpPr>
+      <p:grpSpPr>
+        <a:xfrm>
+          <a:off x="0" y="0"/>
+          <a:ext cx="0" cy="0"/>
+          <a:chOff x="0" y="0"/>
+          <a:chExt cx="0" cy="0"/>
+        </a:xfrm>
+      </p:grpSpPr>
+      <p:sp>
+        <p:nvSpPr>
+          <p:cNvPr id="8" name="Rectangle 7"/>
+          <p:cNvSpPr/>
+          <p:nvPr/>
+        </p:nvSpPr>
+        <p:spPr>
+          <a:xfrm>
+            <a:off x="1720082" y="-1938792"/>
+            <a:ext cx="10145486" cy="10145486"/>
+          </a:xfrm>
+          <a:prstGeom prst="rect">
+            <a:avLst/>
+          </a:prstGeom>
+          <a:solidFill>
+            <a:schemeClr val="bg1"/>
+          </a:solidFill>
+          <a:ln>
+            <a:noFill/>
+          </a:ln>
+        </p:spPr>
+        <p:style>
+          <a:lnRef idx="2">
+            <a:schemeClr val="accent1">
+              <a:shade val="50000"/>
+            </a:schemeClr>
+          </a:lnRef>
+          <a:fillRef idx="1">
+            <a:schemeClr val="accent1"/>
+          </a:fillRef>
+          <a:effectRef idx="0">
+            <a:schemeClr val="accent1"/>
+          </a:effectRef>
+          <a:fontRef idx="minor">
+            <a:schemeClr val="lt1"/>
+          </a:fontRef>
+        </p:style>
+        <p:txBody>
+          <a:bodyPr rtlCol="0" anchor="ctr"/>
+          <a:lstStyle/>
+          <a:p>
+            <a:pPr algn="ctr"/>
+            <a:endParaRPr lang="en-GB"/>
+          </a:p>
+        </p:txBody>
+      </p:sp>
+      <p:cxnSp>
+        <p:nvCxnSpPr>
+          <p:cNvPr id="14" name="Straight Connector 13"/>
+          <p:cNvCxnSpPr/>
+          <p:nvPr/>
+        </p:nvCxnSpPr>
+        <p:spPr>
+          <a:xfrm flipV="1">
+            <a:off x="1710871" y="-1938792"/>
+            <a:ext cx="10145486" cy="10145486"/>
+          </a:xfrm>
+          <a:prstGeom prst="line">
+            <a:avLst/>
+          </a:prstGeom>
+          <a:ln w="76200">
+            <a:solidFill>
+              <a:schemeClr val="tx1">
+                <a:lumMod val="50000"/>
+                <a:lumOff val="50000"/>
+              </a:schemeClr>
+            </a:solidFill>
+            <a:prstDash val="lgDash"/>
+          </a:ln>
+        </p:spPr>
+        <p:style>
+          <a:lnRef idx="1">
+            <a:schemeClr val="accent1"/>
+          </a:lnRef>
+          <a:fillRef idx="0">
+            <a:schemeClr val="accent1"/>
+          </a:fillRef>
+          <a:effectRef idx="0">
+            <a:schemeClr val="accent1"/>
+          </a:effectRef>
+          <a:fontRef idx="minor">
+            <a:schemeClr val="tx1"/>
+          </a:fontRef>
+        </p:style>
+      </p:cxnSp>
+      <p:sp>
+        <p:nvSpPr>
+          <p:cNvPr id="4" name="Rounded Rectangle 3">
+            <a:extLst>
+              <a:ext uri="{FF2B5EF4-FFF2-40B4-BE49-F238E27FC236}">
+                <a16:creationId xmlns:a16="http://schemas.microsoft.com/office/drawing/2014/main" id="{565AFB9D-0231-F545-B44E-FFBF54DD4642}"/>
+              </a:ext>
+            </a:extLst>
+          </p:cNvPr>
+          <p:cNvSpPr/>
+          <p:nvPr/>
+        </p:nvSpPr>
+        <p:spPr>
+          <a:xfrm>
+            <a:off x="2824982" y="3829091"/>
+            <a:ext cx="1578289" cy="3641003"/>
+          </a:xfrm>
+          <a:prstGeom prst="roundRect">
+            <a:avLst/>
+          </a:prstGeom>
+          <a:solidFill>
+            <a:srgbClr val="212121"/>
+          </a:solidFill>
+          <a:ln>
+            <a:noFill/>
+          </a:ln>
+        </p:spPr>
+        <p:style>
+          <a:lnRef idx="2">
+            <a:schemeClr val="dk1">
+              <a:shade val="50000"/>
+            </a:schemeClr>
+          </a:lnRef>
+          <a:fillRef idx="1">
+            <a:schemeClr val="dk1"/>
+          </a:fillRef>
+          <a:effectRef idx="0">
+            <a:schemeClr val="dk1"/>
+          </a:effectRef>
+          <a:fontRef idx="minor">
+            <a:schemeClr val="lt1"/>
+          </a:fontRef>
+        </p:style>
+        <p:txBody>
+          <a:bodyPr rtlCol="0" anchor="ctr"/>
+          <a:lstStyle/>
+          <a:p>
+            <a:pPr algn="ctr"/>
+            <a:endParaRPr lang="en-GB" b="1"/>
+          </a:p>
+        </p:txBody>
+      </p:sp>
+      <p:sp>
+        <p:nvSpPr>
+          <p:cNvPr id="5" name="Oval 4">
+            <a:extLst>
+              <a:ext uri="{FF2B5EF4-FFF2-40B4-BE49-F238E27FC236}">
+                <a16:creationId xmlns:a16="http://schemas.microsoft.com/office/drawing/2014/main" id="{9084FD23-88D0-7B41-B853-870E4F23B8DE}"/>
+              </a:ext>
+            </a:extLst>
+          </p:cNvPr>
+          <p:cNvSpPr/>
+          <p:nvPr/>
+        </p:nvSpPr>
+        <p:spPr>
+          <a:xfrm>
+            <a:off x="3204337" y="4093937"/>
+            <a:ext cx="819578" cy="819578"/>
+          </a:xfrm>
+          <a:prstGeom prst="ellipse">
+            <a:avLst/>
+          </a:prstGeom>
+          <a:solidFill>
+            <a:srgbClr val="FF6161"/>
+          </a:solidFill>
+          <a:ln>
+            <a:noFill/>
+          </a:ln>
+        </p:spPr>
+        <p:style>
+          <a:lnRef idx="2">
+            <a:schemeClr val="accent1">
+              <a:shade val="50000"/>
+            </a:schemeClr>
+          </a:lnRef>
+          <a:fillRef idx="1">
+            <a:schemeClr val="accent1"/>
+          </a:fillRef>
+          <a:effectRef idx="0">
+            <a:schemeClr val="accent1"/>
+          </a:effectRef>
+          <a:fontRef idx="minor">
+            <a:schemeClr val="lt1"/>
+          </a:fontRef>
+        </p:style>
+        <p:txBody>
+          <a:bodyPr rtlCol="0" anchor="ctr"/>
+          <a:lstStyle/>
+          <a:p>
+            <a:pPr algn="ctr"/>
+            <a:endParaRPr lang="en-GB" b="1"/>
+          </a:p>
+        </p:txBody>
+      </p:sp>
+      <p:sp>
+        <p:nvSpPr>
+          <p:cNvPr id="6" name="Oval 5">
+            <a:extLst>
+              <a:ext uri="{FF2B5EF4-FFF2-40B4-BE49-F238E27FC236}">
+                <a16:creationId xmlns:a16="http://schemas.microsoft.com/office/drawing/2014/main" id="{12C82CFD-08C7-994C-A4E1-1EBFB6FFC5E4}"/>
+              </a:ext>
+            </a:extLst>
+          </p:cNvPr>
+          <p:cNvSpPr/>
+          <p:nvPr/>
+        </p:nvSpPr>
+        <p:spPr>
+          <a:xfrm>
+            <a:off x="3204337" y="6385669"/>
+            <a:ext cx="819578" cy="819578"/>
+          </a:xfrm>
+          <a:prstGeom prst="ellipse">
+            <a:avLst/>
+          </a:prstGeom>
+          <a:solidFill>
+            <a:srgbClr val="92D050"/>
+          </a:solidFill>
+          <a:ln>
+            <a:noFill/>
+          </a:ln>
+        </p:spPr>
+        <p:style>
+          <a:lnRef idx="2">
+            <a:schemeClr val="accent1">
+              <a:shade val="50000"/>
+            </a:schemeClr>
+          </a:lnRef>
+          <a:fillRef idx="1">
+            <a:schemeClr val="accent1"/>
+          </a:fillRef>
+          <a:effectRef idx="0">
+            <a:schemeClr val="accent1"/>
+          </a:effectRef>
+          <a:fontRef idx="minor">
+            <a:schemeClr val="lt1"/>
+          </a:fontRef>
+        </p:style>
+        <p:txBody>
+          <a:bodyPr rtlCol="0" anchor="ctr"/>
+          <a:lstStyle/>
+          <a:p>
+            <a:pPr algn="ctr"/>
+            <a:endParaRPr lang="en-GB" b="1"/>
+          </a:p>
+        </p:txBody>
+      </p:sp>
+      <p:sp>
+        <p:nvSpPr>
+          <p:cNvPr id="7" name="Oval 6">
+            <a:extLst>
+              <a:ext uri="{FF2B5EF4-FFF2-40B4-BE49-F238E27FC236}">
+                <a16:creationId xmlns:a16="http://schemas.microsoft.com/office/drawing/2014/main" id="{D8DD0C36-2E93-C44B-AF75-EDFC49C31737}"/>
+              </a:ext>
+            </a:extLst>
+          </p:cNvPr>
+          <p:cNvSpPr/>
+          <p:nvPr/>
+        </p:nvSpPr>
+        <p:spPr>
+          <a:xfrm>
+            <a:off x="3204337" y="5239803"/>
+            <a:ext cx="819578" cy="819578"/>
+          </a:xfrm>
+          <a:prstGeom prst="ellipse">
+            <a:avLst/>
+          </a:prstGeom>
+          <a:solidFill>
+            <a:srgbClr val="FFC000"/>
+          </a:solidFill>
+          <a:ln>
+            <a:noFill/>
+          </a:ln>
+        </p:spPr>
+        <p:style>
+          <a:lnRef idx="2">
+            <a:schemeClr val="accent1">
+              <a:shade val="50000"/>
+            </a:schemeClr>
+          </a:lnRef>
+          <a:fillRef idx="1">
+            <a:schemeClr val="accent1"/>
+          </a:fillRef>
+          <a:effectRef idx="0">
+            <a:schemeClr val="accent1"/>
+          </a:effectRef>
+          <a:fontRef idx="minor">
+            <a:schemeClr val="lt1"/>
+          </a:fontRef>
+        </p:style>
+        <p:txBody>
+          <a:bodyPr rtlCol="0" anchor="ctr"/>
+          <a:lstStyle/>
+          <a:p>
+            <a:pPr algn="ctr"/>
+            <a:endParaRPr lang="en-GB" b="1"/>
+          </a:p>
+        </p:txBody>
+      </p:sp>
+      <p:sp>
+        <p:nvSpPr>
+          <p:cNvPr id="9" name="Rounded Rectangle 8">
+            <a:extLst>
+              <a:ext uri="{FF2B5EF4-FFF2-40B4-BE49-F238E27FC236}">
+                <a16:creationId xmlns:a16="http://schemas.microsoft.com/office/drawing/2014/main" id="{565AFB9D-0231-F545-B44E-FFBF54DD4642}"/>
+              </a:ext>
+            </a:extLst>
+          </p:cNvPr>
+          <p:cNvSpPr/>
+          <p:nvPr/>
+        </p:nvSpPr>
+        <p:spPr>
+          <a:xfrm>
+            <a:off x="9502740" y="-1443492"/>
+            <a:ext cx="1578289" cy="3641003"/>
+          </a:xfrm>
+          <a:prstGeom prst="roundRect">
+            <a:avLst/>
+          </a:prstGeom>
+          <a:solidFill>
+            <a:srgbClr val="212121"/>
+          </a:solidFill>
+          <a:ln>
+            <a:noFill/>
+          </a:ln>
+        </p:spPr>
+        <p:style>
+          <a:lnRef idx="2">
+            <a:schemeClr val="dk1">
+              <a:shade val="50000"/>
+            </a:schemeClr>
+          </a:lnRef>
+          <a:fillRef idx="1">
+            <a:schemeClr val="dk1"/>
+          </a:fillRef>
+          <a:effectRef idx="0">
+            <a:schemeClr val="dk1"/>
+          </a:effectRef>
+          <a:fontRef idx="minor">
+            <a:schemeClr val="lt1"/>
+          </a:fontRef>
+        </p:style>
+        <p:txBody>
+          <a:bodyPr rtlCol="0" anchor="ctr"/>
+          <a:lstStyle/>
+          <a:p>
+            <a:pPr algn="ctr"/>
+            <a:endParaRPr lang="en-GB" b="1"/>
+          </a:p>
+        </p:txBody>
+      </p:sp>
+      <p:sp>
+        <p:nvSpPr>
+          <p:cNvPr id="10" name="Oval 9">
+            <a:extLst>
+              <a:ext uri="{FF2B5EF4-FFF2-40B4-BE49-F238E27FC236}">
+                <a16:creationId xmlns:a16="http://schemas.microsoft.com/office/drawing/2014/main" id="{9084FD23-88D0-7B41-B853-870E4F23B8DE}"/>
+              </a:ext>
+            </a:extLst>
+          </p:cNvPr>
+          <p:cNvSpPr/>
+          <p:nvPr/>
+        </p:nvSpPr>
+        <p:spPr>
+          <a:xfrm>
+            <a:off x="9882095" y="-1178646"/>
+            <a:ext cx="819578" cy="819578"/>
+          </a:xfrm>
+          <a:prstGeom prst="ellipse">
+            <a:avLst/>
+          </a:prstGeom>
+          <a:solidFill>
+            <a:srgbClr val="FF6161"/>
+          </a:solidFill>
+          <a:ln>
+            <a:noFill/>
+          </a:ln>
+        </p:spPr>
+        <p:style>
+          <a:lnRef idx="2">
+            <a:schemeClr val="accent1">
+              <a:shade val="50000"/>
+            </a:schemeClr>
+          </a:lnRef>
+          <a:fillRef idx="1">
+            <a:schemeClr val="accent1"/>
+          </a:fillRef>
+          <a:effectRef idx="0">
+            <a:schemeClr val="accent1"/>
+          </a:effectRef>
+          <a:fontRef idx="minor">
+            <a:schemeClr val="lt1"/>
+          </a:fontRef>
+        </p:style>
+        <p:txBody>
+          <a:bodyPr rtlCol="0" anchor="ctr"/>
+          <a:lstStyle/>
+          <a:p>
+            <a:pPr algn="ctr"/>
+            <a:endParaRPr lang="en-GB" b="1"/>
+          </a:p>
+        </p:txBody>
+      </p:sp>
+      <p:sp>
+        <p:nvSpPr>
+          <p:cNvPr id="11" name="Oval 10">
+            <a:extLst>
+              <a:ext uri="{FF2B5EF4-FFF2-40B4-BE49-F238E27FC236}">
+                <a16:creationId xmlns:a16="http://schemas.microsoft.com/office/drawing/2014/main" id="{12C82CFD-08C7-994C-A4E1-1EBFB6FFC5E4}"/>
+              </a:ext>
+            </a:extLst>
+          </p:cNvPr>
+          <p:cNvSpPr/>
+          <p:nvPr/>
+        </p:nvSpPr>
+        <p:spPr>
+          <a:xfrm>
+            <a:off x="9882095" y="1113086"/>
+            <a:ext cx="819578" cy="819578"/>
+          </a:xfrm>
+          <a:prstGeom prst="ellipse">
+            <a:avLst/>
+          </a:prstGeom>
+          <a:solidFill>
+            <a:srgbClr val="92D050"/>
+          </a:solidFill>
+          <a:ln>
+            <a:noFill/>
+          </a:ln>
+        </p:spPr>
+        <p:style>
+          <a:lnRef idx="2">
+            <a:schemeClr val="accent1">
+              <a:shade val="50000"/>
+            </a:schemeClr>
+          </a:lnRef>
+          <a:fillRef idx="1">
+            <a:schemeClr val="accent1"/>
+          </a:fillRef>
+          <a:effectRef idx="0">
+            <a:schemeClr val="accent1"/>
+          </a:effectRef>
+          <a:fontRef idx="minor">
+            <a:schemeClr val="lt1"/>
+          </a:fontRef>
+        </p:style>
+        <p:txBody>
+          <a:bodyPr rtlCol="0" anchor="ctr"/>
+          <a:lstStyle/>
+          <a:p>
+            <a:pPr algn="ctr"/>
+            <a:endParaRPr lang="en-GB" b="1"/>
+          </a:p>
+        </p:txBody>
+      </p:sp>
+      <p:sp>
+        <p:nvSpPr>
+          <p:cNvPr id="12" name="Oval 11">
+            <a:extLst>
+              <a:ext uri="{FF2B5EF4-FFF2-40B4-BE49-F238E27FC236}">
+                <a16:creationId xmlns:a16="http://schemas.microsoft.com/office/drawing/2014/main" id="{D8DD0C36-2E93-C44B-AF75-EDFC49C31737}"/>
+              </a:ext>
+            </a:extLst>
+          </p:cNvPr>
+          <p:cNvSpPr/>
+          <p:nvPr/>
+        </p:nvSpPr>
+        <p:spPr>
+          <a:xfrm>
+            <a:off x="9882095" y="-32780"/>
+            <a:ext cx="819578" cy="819578"/>
+          </a:xfrm>
+          <a:prstGeom prst="ellipse">
+            <a:avLst/>
+          </a:prstGeom>
+          <a:solidFill>
+            <a:srgbClr val="FFC000"/>
+          </a:solidFill>
+          <a:ln>
+            <a:noFill/>
+          </a:ln>
+        </p:spPr>
+        <p:style>
+          <a:lnRef idx="2">
+            <a:schemeClr val="accent1">
+              <a:shade val="50000"/>
+            </a:schemeClr>
+          </a:lnRef>
+          <a:fillRef idx="1">
+            <a:schemeClr val="accent1"/>
+          </a:fillRef>
+          <a:effectRef idx="0">
+            <a:schemeClr val="accent1"/>
+          </a:effectRef>
+          <a:fontRef idx="minor">
+            <a:schemeClr val="lt1"/>
+          </a:fontRef>
+        </p:style>
+        <p:txBody>
+          <a:bodyPr rtlCol="0" anchor="ctr"/>
+          <a:lstStyle/>
+          <a:p>
+            <a:pPr algn="ctr"/>
+            <a:endParaRPr lang="en-GB" b="1"/>
+          </a:p>
+        </p:txBody>
+      </p:sp>
+      <p:cxnSp>
+        <p:nvCxnSpPr>
+          <p:cNvPr id="16" name="Straight Connector 15"/>
+          <p:cNvCxnSpPr/>
+          <p:nvPr/>
+        </p:nvCxnSpPr>
+        <p:spPr>
+          <a:xfrm flipV="1">
+            <a:off x="1661885" y="-1938792"/>
+            <a:ext cx="6852307" cy="6852308"/>
+          </a:xfrm>
+          <a:prstGeom prst="line">
+            <a:avLst/>
+          </a:prstGeom>
+          <a:ln w="76200">
+            <a:solidFill>
+              <a:schemeClr val="tx1">
+                <a:lumMod val="50000"/>
+                <a:lumOff val="50000"/>
+              </a:schemeClr>
+            </a:solidFill>
+            <a:prstDash val="solid"/>
+          </a:ln>
+        </p:spPr>
+        <p:style>
+          <a:lnRef idx="1">
+            <a:schemeClr val="accent1"/>
+          </a:lnRef>
+          <a:fillRef idx="0">
+            <a:schemeClr val="accent1"/>
+          </a:fillRef>
+          <a:effectRef idx="0">
+            <a:schemeClr val="accent1"/>
+          </a:effectRef>
+          <a:fontRef idx="minor">
+            <a:schemeClr val="tx1"/>
+          </a:fontRef>
+        </p:style>
+      </p:cxnSp>
+      <p:cxnSp>
+        <p:nvCxnSpPr>
+          <p:cNvPr id="19" name="Straight Connector 18"/>
+          <p:cNvCxnSpPr/>
+          <p:nvPr/>
+        </p:nvCxnSpPr>
+        <p:spPr>
+          <a:xfrm flipV="1">
+            <a:off x="5004050" y="1354386"/>
+            <a:ext cx="6852307" cy="6852308"/>
+          </a:xfrm>
+          <a:prstGeom prst="line">
+            <a:avLst/>
+          </a:prstGeom>
+          <a:ln w="76200">
+            <a:solidFill>
+              <a:schemeClr val="tx1">
+                <a:lumMod val="50000"/>
+                <a:lumOff val="50000"/>
+              </a:schemeClr>
+            </a:solidFill>
+            <a:prstDash val="solid"/>
+          </a:ln>
+        </p:spPr>
+        <p:style>
+          <a:lnRef idx="1">
+            <a:schemeClr val="accent1"/>
+          </a:lnRef>
+          <a:fillRef idx="0">
+            <a:schemeClr val="accent1"/>
+          </a:fillRef>
+          <a:effectRef idx="0">
+            <a:schemeClr val="accent1"/>
+          </a:effectRef>
+          <a:fontRef idx="minor">
+            <a:schemeClr val="tx1"/>
+          </a:fontRef>
+        </p:style>
+      </p:cxnSp>
+      <p:pic>
+        <p:nvPicPr>
+          <p:cNvPr id="22" name="Picture 21"/>
+          <p:cNvPicPr>
+            <a:picLocks noChangeAspect="1"/>
+          </p:cNvPicPr>
+          <p:nvPr/>
+        </p:nvPicPr>
+        <p:blipFill>
+          <a:blip r:embed="rId2" cstate="print">
+            <a:duotone>
+              <a:schemeClr val="accent4">
+                <a:shade val="45000"/>
+                <a:satMod val="135000"/>
+              </a:schemeClr>
+              <a:prstClr val="white"/>
+            </a:duotone>
+            <a:extLst>
+              <a:ext uri="{28A0092B-C50C-407E-A947-70E740481C1C}">
+                <a14:useLocalDpi xmlns:a14="http://schemas.microsoft.com/office/drawing/2010/main" val="0"/>
+              </a:ext>
+            </a:extLst>
+          </a:blip>
+          <a:stretch>
+            <a:fillRect/>
+          </a:stretch>
+        </p:blipFill>
+        <p:spPr>
+          <a:xfrm>
+            <a:off x="2423201" y="-1432785"/>
+            <a:ext cx="1980070" cy="1980070"/>
+          </a:xfrm>
+          <a:prstGeom prst="rect">
+            <a:avLst/>
+          </a:prstGeom>
+        </p:spPr>
+      </p:pic>
+      <p:pic>
+        <p:nvPicPr>
+          <p:cNvPr id="23" name="Picture 22"/>
+          <p:cNvPicPr>
+            <a:picLocks noChangeAspect="1"/>
+          </p:cNvPicPr>
+          <p:nvPr/>
+        </p:nvPicPr>
+        <p:blipFill>
+          <a:blip r:embed="rId2" cstate="print">
+            <a:duotone>
+              <a:schemeClr val="accent4">
+                <a:shade val="45000"/>
+                <a:satMod val="135000"/>
+              </a:schemeClr>
+              <a:prstClr val="white"/>
+            </a:duotone>
+            <a:extLst>
+              <a:ext uri="{28A0092B-C50C-407E-A947-70E740481C1C}">
+                <a14:useLocalDpi xmlns:a14="http://schemas.microsoft.com/office/drawing/2010/main" val="0"/>
+              </a:ext>
+            </a:extLst>
+          </a:blip>
+          <a:stretch>
+            <a:fillRect/>
+          </a:stretch>
+        </p:blipFill>
+        <p:spPr>
+          <a:xfrm>
+            <a:off x="9301849" y="5490689"/>
+            <a:ext cx="1980070" cy="1980070"/>
+          </a:xfrm>
+          <a:prstGeom prst="rect">
+            <a:avLst/>
+          </a:prstGeom>
+        </p:spPr>
+      </p:pic>
+    </p:spTree>
+    <p:extLst>
+      <p:ext uri="{BB962C8B-B14F-4D97-AF65-F5344CB8AC3E}">
+        <p14:creationId xmlns:p14="http://schemas.microsoft.com/office/powerpoint/2010/main" val="1592622977"/>
       </p:ext>
     </p:extLst>
   </p:cSld>

</xml_diff>